<commit_message>
update narrator and new scene
update narrator and new scene
</commit_message>
<xml_diff>
--- a/V-SET.pptx
+++ b/V-SET.pptx
@@ -14697,6 +14697,36 @@
           </a:p>
         </p:txBody>
       </p:sp>
+      <p:sp>
+        <p:nvSpPr>
+          <p:cNvPr id="18" name="文字方塊 17"/>
+          <p:cNvSpPr txBox="1"/>
+          <p:nvPr/>
+        </p:nvSpPr>
+        <p:spPr>
+          <a:xfrm>
+            <a:off x="990600" y="5843314"/>
+            <a:ext cx="2133600" cy="369332"/>
+          </a:xfrm>
+          <a:prstGeom prst="rect">
+            <a:avLst/>
+          </a:prstGeom>
+          <a:noFill/>
+        </p:spPr>
+        <p:txBody>
+          <a:bodyPr wrap="square" rtlCol="0">
+            <a:spAutoFit/>
+          </a:bodyPr>
+          <a:lstStyle/>
+          <a:p>
+            <a:r>
+              <a:rPr lang="en-US" altLang="zh-TW" dirty="0" smtClean="0"/>
+              <a:t>Story events</a:t>
+            </a:r>
+            <a:endParaRPr lang="en-US" dirty="0"/>
+          </a:p>
+        </p:txBody>
+      </p:sp>
     </p:spTree>
     <p:extLst>
       <p:ext uri="{BB962C8B-B14F-4D97-AF65-F5344CB8AC3E}">
@@ -16068,6 +16098,106 @@
             <a:r>
               <a:rPr lang="en-US" altLang="zh-TW" dirty="0" smtClean="0"/>
               <a:t>Story content</a:t>
+            </a:r>
+            <a:endParaRPr lang="en-US" dirty="0"/>
+          </a:p>
+        </p:txBody>
+      </p:sp>
+      <p:sp>
+        <p:nvSpPr>
+          <p:cNvPr id="30" name="標題 1"/>
+          <p:cNvSpPr txBox="1">
+            <a:spLocks/>
+          </p:cNvSpPr>
+          <p:nvPr/>
+        </p:nvSpPr>
+        <p:spPr>
+          <a:xfrm>
+            <a:off x="419819" y="304800"/>
+            <a:ext cx="4410634" cy="717657"/>
+          </a:xfrm>
+          <a:prstGeom prst="rect">
+            <a:avLst/>
+          </a:prstGeom>
+        </p:spPr>
+        <p:txBody>
+          <a:bodyPr/>
+          <a:lstStyle>
+            <a:lvl1pPr algn="l" defTabSz="914400" rtl="0" eaLnBrk="1" latinLnBrk="0" hangingPunct="1">
+              <a:spcBef>
+                <a:spcPct val="0"/>
+              </a:spcBef>
+              <a:buNone/>
+              <a:defRPr sz="4000" kern="1200">
+                <a:solidFill>
+                  <a:schemeClr val="accent1"/>
+                </a:solidFill>
+                <a:latin typeface="+mj-lt"/>
+                <a:ea typeface="+mj-ea"/>
+                <a:cs typeface="+mj-cs"/>
+              </a:defRPr>
+            </a:lvl1pPr>
+            <a:lvl2pPr eaLnBrk="1" hangingPunct="1">
+              <a:defRPr>
+                <a:solidFill>
+                  <a:schemeClr val="tx2"/>
+                </a:solidFill>
+              </a:defRPr>
+            </a:lvl2pPr>
+            <a:lvl3pPr eaLnBrk="1" hangingPunct="1">
+              <a:defRPr>
+                <a:solidFill>
+                  <a:schemeClr val="tx2"/>
+                </a:solidFill>
+              </a:defRPr>
+            </a:lvl3pPr>
+            <a:lvl4pPr eaLnBrk="1" hangingPunct="1">
+              <a:defRPr>
+                <a:solidFill>
+                  <a:schemeClr val="tx2"/>
+                </a:solidFill>
+              </a:defRPr>
+            </a:lvl4pPr>
+            <a:lvl5pPr eaLnBrk="1" hangingPunct="1">
+              <a:defRPr>
+                <a:solidFill>
+                  <a:schemeClr val="tx2"/>
+                </a:solidFill>
+              </a:defRPr>
+            </a:lvl5pPr>
+            <a:lvl6pPr eaLnBrk="1" hangingPunct="1">
+              <a:defRPr>
+                <a:solidFill>
+                  <a:schemeClr val="tx2"/>
+                </a:solidFill>
+              </a:defRPr>
+            </a:lvl6pPr>
+            <a:lvl7pPr eaLnBrk="1" hangingPunct="1">
+              <a:defRPr>
+                <a:solidFill>
+                  <a:schemeClr val="tx2"/>
+                </a:solidFill>
+              </a:defRPr>
+            </a:lvl7pPr>
+            <a:lvl8pPr eaLnBrk="1" hangingPunct="1">
+              <a:defRPr>
+                <a:solidFill>
+                  <a:schemeClr val="tx2"/>
+                </a:solidFill>
+              </a:defRPr>
+            </a:lvl8pPr>
+            <a:lvl9pPr eaLnBrk="1" hangingPunct="1">
+              <a:defRPr>
+                <a:solidFill>
+                  <a:schemeClr val="tx2"/>
+                </a:solidFill>
+              </a:defRPr>
+            </a:lvl9pPr>
+          </a:lstStyle>
+          <a:p>
+            <a:r>
+              <a:rPr lang="en-US" dirty="0" smtClean="0"/>
+              <a:t>Data Flow</a:t>
             </a:r>
             <a:endParaRPr lang="en-US" dirty="0"/>
           </a:p>

</xml_diff>